<commit_message>
collected more images for report
</commit_message>
<xml_diff>
--- a/paper/dispNormMaxPool.pptx
+++ b/paper/dispNormMaxPool.pptx
@@ -104,6 +104,11 @@
       </a:defRPr>
     </a:lvl9pPr>
   </p:defaultTextStyle>
+  <p:extLst>
+    <p:ext uri="{EFAFB233-063F-42B5-8137-9DF3F51BA10A}">
+      <p15:sldGuideLst xmlns:p15="http://schemas.microsoft.com/office/powerpoint/2012/main"/>
+    </p:ext>
+  </p:extLst>
 </p:presentation>
 </file>
 
@@ -3323,10 +3328,10 @@
       </p:grpSpPr>
       <p:grpSp>
         <p:nvGrpSpPr>
-          <p:cNvPr id="54" name="Group 53">
-            <a:extLst>
-              <a:ext uri="{FF2B5EF4-FFF2-40B4-BE49-F238E27FC236}">
-                <a16:creationId xmlns:a16="http://schemas.microsoft.com/office/drawing/2014/main" id="{B75040B3-D5DE-4216-8619-FF53E47CD69B}"/>
+          <p:cNvPr id="8" name="Group 7">
+            <a:extLst>
+              <a:ext uri="{FF2B5EF4-FFF2-40B4-BE49-F238E27FC236}">
+                <a16:creationId xmlns:a16="http://schemas.microsoft.com/office/drawing/2014/main" id="{D8A5251F-5474-4CD0-8923-5EEC4AC217CF}"/>
               </a:ext>
             </a:extLst>
           </p:cNvPr>
@@ -4352,6 +4357,41 @@
             </a:p>
           </p:txBody>
         </p:sp>
+        <p:sp>
+          <p:nvSpPr>
+            <p:cNvPr id="3" name="TextBox 2">
+              <a:extLst>
+                <a:ext uri="{FF2B5EF4-FFF2-40B4-BE49-F238E27FC236}">
+                  <a16:creationId xmlns:a16="http://schemas.microsoft.com/office/drawing/2014/main" id="{2029A3DB-4409-444B-BB73-7C38A0825532}"/>
+                </a:ext>
+              </a:extLst>
+            </p:cNvPr>
+            <p:cNvSpPr txBox="1"/>
+            <p:nvPr/>
+          </p:nvSpPr>
+          <p:spPr>
+            <a:xfrm>
+              <a:off x="1924922" y="3593188"/>
+              <a:ext cx="325529" cy="246221"/>
+            </a:xfrm>
+            <a:prstGeom prst="rect">
+              <a:avLst/>
+            </a:prstGeom>
+            <a:noFill/>
+          </p:spPr>
+          <p:txBody>
+            <a:bodyPr wrap="square" rtlCol="0">
+              <a:spAutoFit/>
+            </a:bodyPr>
+            <a:lstStyle/>
+            <a:p>
+              <a:r>
+                <a:rPr lang="en-US" sz="1000" dirty="0"/>
+                <a:t>24</a:t>
+              </a:r>
+            </a:p>
+          </p:txBody>
+        </p:sp>
       </p:grpSp>
     </p:spTree>
     <p:extLst>

</xml_diff>